<commit_message>
UserGuide.adoc: Update Labelled UI image
</commit_message>
<xml_diff>
--- a/docs/diagrams/UiLabelled.pptx
+++ b/docs/diagrams/UiLabelled.pptx
@@ -104,6 +104,11 @@
       </a:defRPr>
     </a:lvl9pPr>
   </p:defaultTextStyle>
+  <p:extLst>
+    <p:ext uri="{EFAFB233-063F-42B5-8137-9DF3F51BA10A}">
+      <p15:sldGuideLst xmlns:p15="http://schemas.microsoft.com/office/powerpoint/2012/main"/>
+    </p:ext>
+  </p:extLst>
 </p:presentation>
 </file>
 
@@ -256,7 +261,7 @@
           <a:p>
             <a:fld id="{5C78F3B7-5ABA-4E0E-98BF-6BC20D32D6A6}" type="datetimeFigureOut">
               <a:rPr lang="en-SG" smtClean="0"/>
-              <a:t>28/10/2018</a:t>
+              <a:t>31/10/2018</a:t>
             </a:fld>
             <a:endParaRPr lang="en-SG"/>
           </a:p>
@@ -456,7 +461,7 @@
           <a:p>
             <a:fld id="{5C78F3B7-5ABA-4E0E-98BF-6BC20D32D6A6}" type="datetimeFigureOut">
               <a:rPr lang="en-SG" smtClean="0"/>
-              <a:t>28/10/2018</a:t>
+              <a:t>31/10/2018</a:t>
             </a:fld>
             <a:endParaRPr lang="en-SG"/>
           </a:p>
@@ -666,7 +671,7 @@
           <a:p>
             <a:fld id="{5C78F3B7-5ABA-4E0E-98BF-6BC20D32D6A6}" type="datetimeFigureOut">
               <a:rPr lang="en-SG" smtClean="0"/>
-              <a:t>28/10/2018</a:t>
+              <a:t>31/10/2018</a:t>
             </a:fld>
             <a:endParaRPr lang="en-SG"/>
           </a:p>
@@ -866,7 +871,7 @@
           <a:p>
             <a:fld id="{5C78F3B7-5ABA-4E0E-98BF-6BC20D32D6A6}" type="datetimeFigureOut">
               <a:rPr lang="en-SG" smtClean="0"/>
-              <a:t>28/10/2018</a:t>
+              <a:t>31/10/2018</a:t>
             </a:fld>
             <a:endParaRPr lang="en-SG"/>
           </a:p>
@@ -1142,7 +1147,7 @@
           <a:p>
             <a:fld id="{5C78F3B7-5ABA-4E0E-98BF-6BC20D32D6A6}" type="datetimeFigureOut">
               <a:rPr lang="en-SG" smtClean="0"/>
-              <a:t>28/10/2018</a:t>
+              <a:t>31/10/2018</a:t>
             </a:fld>
             <a:endParaRPr lang="en-SG"/>
           </a:p>
@@ -1410,7 +1415,7 @@
           <a:p>
             <a:fld id="{5C78F3B7-5ABA-4E0E-98BF-6BC20D32D6A6}" type="datetimeFigureOut">
               <a:rPr lang="en-SG" smtClean="0"/>
-              <a:t>28/10/2018</a:t>
+              <a:t>31/10/2018</a:t>
             </a:fld>
             <a:endParaRPr lang="en-SG"/>
           </a:p>
@@ -1825,7 +1830,7 @@
           <a:p>
             <a:fld id="{5C78F3B7-5ABA-4E0E-98BF-6BC20D32D6A6}" type="datetimeFigureOut">
               <a:rPr lang="en-SG" smtClean="0"/>
-              <a:t>28/10/2018</a:t>
+              <a:t>31/10/2018</a:t>
             </a:fld>
             <a:endParaRPr lang="en-SG"/>
           </a:p>
@@ -1967,7 +1972,7 @@
           <a:p>
             <a:fld id="{5C78F3B7-5ABA-4E0E-98BF-6BC20D32D6A6}" type="datetimeFigureOut">
               <a:rPr lang="en-SG" smtClean="0"/>
-              <a:t>28/10/2018</a:t>
+              <a:t>31/10/2018</a:t>
             </a:fld>
             <a:endParaRPr lang="en-SG"/>
           </a:p>
@@ -2080,7 +2085,7 @@
           <a:p>
             <a:fld id="{5C78F3B7-5ABA-4E0E-98BF-6BC20D32D6A6}" type="datetimeFigureOut">
               <a:rPr lang="en-SG" smtClean="0"/>
-              <a:t>28/10/2018</a:t>
+              <a:t>31/10/2018</a:t>
             </a:fld>
             <a:endParaRPr lang="en-SG"/>
           </a:p>
@@ -2393,7 +2398,7 @@
           <a:p>
             <a:fld id="{5C78F3B7-5ABA-4E0E-98BF-6BC20D32D6A6}" type="datetimeFigureOut">
               <a:rPr lang="en-SG" smtClean="0"/>
-              <a:t>28/10/2018</a:t>
+              <a:t>31/10/2018</a:t>
             </a:fld>
             <a:endParaRPr lang="en-SG"/>
           </a:p>
@@ -2682,7 +2687,7 @@
           <a:p>
             <a:fld id="{5C78F3B7-5ABA-4E0E-98BF-6BC20D32D6A6}" type="datetimeFigureOut">
               <a:rPr lang="en-SG" smtClean="0"/>
-              <a:t>28/10/2018</a:t>
+              <a:t>31/10/2018</a:t>
             </a:fld>
             <a:endParaRPr lang="en-SG"/>
           </a:p>
@@ -2925,7 +2930,7 @@
           <a:p>
             <a:fld id="{5C78F3B7-5ABA-4E0E-98BF-6BC20D32D6A6}" type="datetimeFigureOut">
               <a:rPr lang="en-SG" smtClean="0"/>
-              <a:t>28/10/2018</a:t>
+              <a:t>31/10/2018</a:t>
             </a:fld>
             <a:endParaRPr lang="en-SG"/>
           </a:p>
@@ -3344,10 +3349,10 @@
       </p:grpSpPr>
       <p:pic>
         <p:nvPicPr>
-          <p:cNvPr id="4" name="Picture 3">
-            <a:extLst>
-              <a:ext uri="{FF2B5EF4-FFF2-40B4-BE49-F238E27FC236}">
-                <a16:creationId xmlns:a16="http://schemas.microsoft.com/office/drawing/2014/main" id="{E0D64426-724A-44E1-A459-A85AB442ED9C}"/>
+          <p:cNvPr id="2" name="Picture 1">
+            <a:extLst>
+              <a:ext uri="{FF2B5EF4-FFF2-40B4-BE49-F238E27FC236}">
+                <a16:creationId xmlns:a16="http://schemas.microsoft.com/office/drawing/2014/main" id="{85D250D1-F304-4A24-8078-B6C03F25A56A}"/>
               </a:ext>
             </a:extLst>
           </p:cNvPr>
@@ -3370,12 +3375,6 @@
           <a:prstGeom prst="rect">
             <a:avLst/>
           </a:prstGeom>
-          <a:noFill/>
-          <a:ln>
-            <a:solidFill>
-              <a:srgbClr val="C00000"/>
-            </a:solidFill>
-          </a:ln>
         </p:spPr>
       </p:pic>
       <p:sp>

</xml_diff>